<commit_message>
Update P2 - Hidden Markov Model.pptx
</commit_message>
<xml_diff>
--- a/projects/HMM/P2 - Hidden Markov Model.pptx
+++ b/projects/HMM/P2 - Hidden Markov Model.pptx
@@ -5,7 +5,7 @@
     <p:sldMasterId id="2147483660" r:id="rId1"/>
   </p:sldMasterIdLst>
   <p:notesMasterIdLst>
-    <p:notesMasterId r:id="rId18"/>
+    <p:notesMasterId r:id="rId19"/>
   </p:notesMasterIdLst>
   <p:sldIdLst>
     <p:sldId id="256" r:id="rId2"/>
@@ -17,13 +17,14 @@
     <p:sldId id="461" r:id="rId8"/>
     <p:sldId id="451" r:id="rId9"/>
     <p:sldId id="456" r:id="rId10"/>
-    <p:sldId id="460" r:id="rId11"/>
-    <p:sldId id="446" r:id="rId12"/>
-    <p:sldId id="459" r:id="rId13"/>
-    <p:sldId id="457" r:id="rId14"/>
-    <p:sldId id="458" r:id="rId15"/>
-    <p:sldId id="267" r:id="rId16"/>
-    <p:sldId id="257" r:id="rId17"/>
+    <p:sldId id="462" r:id="rId11"/>
+    <p:sldId id="460" r:id="rId12"/>
+    <p:sldId id="446" r:id="rId13"/>
+    <p:sldId id="459" r:id="rId14"/>
+    <p:sldId id="457" r:id="rId15"/>
+    <p:sldId id="458" r:id="rId16"/>
+    <p:sldId id="267" r:id="rId17"/>
+    <p:sldId id="257" r:id="rId18"/>
   </p:sldIdLst>
   <p:sldSz cx="12192000" cy="6858000"/>
   <p:notesSz cx="6858000" cy="9144000"/>
@@ -212,7 +213,7 @@
           <a:p>
             <a:fld id="{A0C1F70C-5BF6-43D2-96A0-6511110BD68E}" type="datetimeFigureOut">
               <a:rPr lang="en-US" smtClean="0"/>
-              <a:t>12/4/2020</a:t>
+              <a:t>12/9/2020</a:t>
             </a:fld>
             <a:endParaRPr lang="en-US"/>
           </a:p>
@@ -697,7 +698,23 @@
           <a:bodyPr/>
           <a:lstStyle/>
           <a:p>
+            <a:r>
+              <a:rPr lang="en-US" dirty="0"/>
+              <a:t>https://www.inf.ed.ac.uk/teaching/courses/asr/2017-18/asr03-hmmgmm-handout.pdf</a:t>
+            </a:r>
+          </a:p>
+          <a:p>
             <a:endParaRPr lang="en-US" dirty="0"/>
+          </a:p>
+          <a:p>
+            <a:r>
+              <a:rPr lang="en-US" dirty="0"/>
+              <a:t>Types of </a:t>
+            </a:r>
+            <a:r>
+              <a:rPr lang="en-US"/>
+              <a:t>covariance matrix: https://stats.stackexchange.com/questions/326671/different-covariance-types-for-gaussian-mixture-models</a:t>
+            </a:r>
           </a:p>
         </p:txBody>
       </p:sp>
@@ -718,7 +735,7 @@
           <a:p>
             <a:fld id="{63CC9EBA-D40F-4B2C-8629-D756AD22D0E0}" type="slidenum">
               <a:rPr lang="en-US" smtClean="0"/>
-              <a:t>14</a:t>
+              <a:t>10</a:t>
             </a:fld>
             <a:endParaRPr lang="en-US"/>
           </a:p>
@@ -727,7 +744,7 @@
     </p:spTree>
     <p:extLst>
       <p:ext uri="{BB962C8B-B14F-4D97-AF65-F5344CB8AC3E}">
-        <p14:creationId xmlns:p14="http://schemas.microsoft.com/office/powerpoint/2010/main" val="3632524534"/>
+        <p14:creationId xmlns:p14="http://schemas.microsoft.com/office/powerpoint/2010/main" val="1323544144"/>
       </p:ext>
     </p:extLst>
   </p:cSld>
@@ -802,7 +819,175 @@
           <a:p>
             <a:fld id="{63CC9EBA-D40F-4B2C-8629-D756AD22D0E0}" type="slidenum">
               <a:rPr lang="en-US" smtClean="0"/>
+              <a:t>11</a:t>
+            </a:fld>
+            <a:endParaRPr lang="en-US"/>
+          </a:p>
+        </p:txBody>
+      </p:sp>
+    </p:spTree>
+    <p:extLst>
+      <p:ext uri="{BB962C8B-B14F-4D97-AF65-F5344CB8AC3E}">
+        <p14:creationId xmlns:p14="http://schemas.microsoft.com/office/powerpoint/2010/main" val="433627180"/>
+      </p:ext>
+    </p:extLst>
+  </p:cSld>
+  <p:clrMapOvr>
+    <a:masterClrMapping/>
+  </p:clrMapOvr>
+</p:notes>
+</file>
+
+<file path=ppt/notesSlides/notesSlide5.xml><?xml version="1.0" encoding="utf-8"?>
+<p:notes xmlns:a="http://schemas.openxmlformats.org/drawingml/2006/main" xmlns:r="http://schemas.openxmlformats.org/officeDocument/2006/relationships" xmlns:p="http://schemas.openxmlformats.org/presentationml/2006/main">
+  <p:cSld>
+    <p:spTree>
+      <p:nvGrpSpPr>
+        <p:cNvPr id="1" name=""/>
+        <p:cNvGrpSpPr/>
+        <p:nvPr/>
+      </p:nvGrpSpPr>
+      <p:grpSpPr>
+        <a:xfrm>
+          <a:off x="0" y="0"/>
+          <a:ext cx="0" cy="0"/>
+          <a:chOff x="0" y="0"/>
+          <a:chExt cx="0" cy="0"/>
+        </a:xfrm>
+      </p:grpSpPr>
+      <p:sp>
+        <p:nvSpPr>
+          <p:cNvPr id="2" name="Slide Image Placeholder 1"/>
+          <p:cNvSpPr>
+            <a:spLocks noGrp="1" noRot="1" noChangeAspect="1"/>
+          </p:cNvSpPr>
+          <p:nvPr>
+            <p:ph type="sldImg"/>
+          </p:nvPr>
+        </p:nvSpPr>
+        <p:spPr/>
+      </p:sp>
+      <p:sp>
+        <p:nvSpPr>
+          <p:cNvPr id="3" name="Notes Placeholder 2"/>
+          <p:cNvSpPr>
+            <a:spLocks noGrp="1"/>
+          </p:cNvSpPr>
+          <p:nvPr>
+            <p:ph type="body" idx="1"/>
+          </p:nvPr>
+        </p:nvSpPr>
+        <p:spPr/>
+        <p:txBody>
+          <a:bodyPr/>
+          <a:lstStyle/>
+          <a:p>
+            <a:endParaRPr lang="en-US" dirty="0"/>
+          </a:p>
+        </p:txBody>
+      </p:sp>
+      <p:sp>
+        <p:nvSpPr>
+          <p:cNvPr id="4" name="Slide Number Placeholder 3"/>
+          <p:cNvSpPr>
+            <a:spLocks noGrp="1"/>
+          </p:cNvSpPr>
+          <p:nvPr>
+            <p:ph type="sldNum" sz="quarter" idx="5"/>
+          </p:nvPr>
+        </p:nvSpPr>
+        <p:spPr/>
+        <p:txBody>
+          <a:bodyPr/>
+          <a:lstStyle/>
+          <a:p>
+            <a:fld id="{63CC9EBA-D40F-4B2C-8629-D756AD22D0E0}" type="slidenum">
+              <a:rPr lang="en-US" smtClean="0"/>
               <a:t>15</a:t>
+            </a:fld>
+            <a:endParaRPr lang="en-US"/>
+          </a:p>
+        </p:txBody>
+      </p:sp>
+    </p:spTree>
+    <p:extLst>
+      <p:ext uri="{BB962C8B-B14F-4D97-AF65-F5344CB8AC3E}">
+        <p14:creationId xmlns:p14="http://schemas.microsoft.com/office/powerpoint/2010/main" val="3632524534"/>
+      </p:ext>
+    </p:extLst>
+  </p:cSld>
+  <p:clrMapOvr>
+    <a:masterClrMapping/>
+  </p:clrMapOvr>
+</p:notes>
+</file>
+
+<file path=ppt/notesSlides/notesSlide6.xml><?xml version="1.0" encoding="utf-8"?>
+<p:notes xmlns:a="http://schemas.openxmlformats.org/drawingml/2006/main" xmlns:r="http://schemas.openxmlformats.org/officeDocument/2006/relationships" xmlns:p="http://schemas.openxmlformats.org/presentationml/2006/main">
+  <p:cSld>
+    <p:spTree>
+      <p:nvGrpSpPr>
+        <p:cNvPr id="1" name=""/>
+        <p:cNvGrpSpPr/>
+        <p:nvPr/>
+      </p:nvGrpSpPr>
+      <p:grpSpPr>
+        <a:xfrm>
+          <a:off x="0" y="0"/>
+          <a:ext cx="0" cy="0"/>
+          <a:chOff x="0" y="0"/>
+          <a:chExt cx="0" cy="0"/>
+        </a:xfrm>
+      </p:grpSpPr>
+      <p:sp>
+        <p:nvSpPr>
+          <p:cNvPr id="2" name="Slide Image Placeholder 1"/>
+          <p:cNvSpPr>
+            <a:spLocks noGrp="1" noRot="1" noChangeAspect="1"/>
+          </p:cNvSpPr>
+          <p:nvPr>
+            <p:ph type="sldImg"/>
+          </p:nvPr>
+        </p:nvSpPr>
+        <p:spPr/>
+      </p:sp>
+      <p:sp>
+        <p:nvSpPr>
+          <p:cNvPr id="3" name="Notes Placeholder 2"/>
+          <p:cNvSpPr>
+            <a:spLocks noGrp="1"/>
+          </p:cNvSpPr>
+          <p:nvPr>
+            <p:ph type="body" idx="1"/>
+          </p:nvPr>
+        </p:nvSpPr>
+        <p:spPr/>
+        <p:txBody>
+          <a:bodyPr/>
+          <a:lstStyle/>
+          <a:p>
+            <a:endParaRPr lang="en-US" dirty="0"/>
+          </a:p>
+        </p:txBody>
+      </p:sp>
+      <p:sp>
+        <p:nvSpPr>
+          <p:cNvPr id="4" name="Slide Number Placeholder 3"/>
+          <p:cNvSpPr>
+            <a:spLocks noGrp="1"/>
+          </p:cNvSpPr>
+          <p:nvPr>
+            <p:ph type="sldNum" sz="quarter" idx="5"/>
+          </p:nvPr>
+        </p:nvSpPr>
+        <p:spPr/>
+        <p:txBody>
+          <a:bodyPr/>
+          <a:lstStyle/>
+          <a:p>
+            <a:fld id="{63CC9EBA-D40F-4B2C-8629-D756AD22D0E0}" type="slidenum">
+              <a:rPr lang="en-US" smtClean="0"/>
+              <a:t>16</a:t>
             </a:fld>
             <a:endParaRPr lang="en-US"/>
           </a:p>
@@ -2545,7 +2730,7 @@
           <a:p>
             <a:fld id="{D56A5F13-4F86-5646-9B99-A42325757066}" type="datetime1">
               <a:rPr lang="en-US" smtClean="0"/>
-              <a:t>12/4/2020</a:t>
+              <a:t>12/9/2020</a:t>
             </a:fld>
             <a:endParaRPr lang="en-US"/>
           </a:p>
@@ -2834,7 +3019,7 @@
           <a:p>
             <a:fld id="{34C8E77E-B710-C741-B9C3-BDFAF2BD28F5}" type="datetime1">
               <a:rPr lang="en-US" smtClean="0"/>
-              <a:t>12/4/2020</a:t>
+              <a:t>12/9/2020</a:t>
             </a:fld>
             <a:endParaRPr lang="en-US"/>
           </a:p>
@@ -3123,7 +3308,7 @@
           <a:p>
             <a:fld id="{3CC70E32-BC87-A748-B8DC-BBE1A8E155BB}" type="datetime1">
               <a:rPr lang="en-US" smtClean="0"/>
-              <a:t>12/4/2020</a:t>
+              <a:t>12/9/2020</a:t>
             </a:fld>
             <a:endParaRPr lang="en-US"/>
           </a:p>
@@ -3412,7 +3597,7 @@
           <a:p>
             <a:fld id="{FF80D806-2732-D74C-AA54-685EF616F24A}" type="datetime1">
               <a:rPr lang="en-US" smtClean="0"/>
-              <a:t>12/4/2020</a:t>
+              <a:t>12/9/2020</a:t>
             </a:fld>
             <a:endParaRPr lang="en-US"/>
           </a:p>
@@ -3649,7 +3834,7 @@
           <a:p>
             <a:fld id="{7EE62EE2-D39B-DB40-8504-5F31AB3A7B1B}" type="datetime1">
               <a:rPr lang="en-US" smtClean="0"/>
-              <a:t>12/4/2020</a:t>
+              <a:t>12/9/2020</a:t>
             </a:fld>
             <a:endParaRPr lang="en-US"/>
           </a:p>
@@ -4106,7 +4291,7 @@
           <a:p>
             <a:fld id="{F2C6AE98-BAC0-8443-BBA0-C97A4F30D31A}" type="datetime1">
               <a:rPr lang="en-US" smtClean="0"/>
-              <a:t>12/4/2020</a:t>
+              <a:t>12/9/2020</a:t>
             </a:fld>
             <a:endParaRPr lang="en-US"/>
           </a:p>
@@ -4374,7 +4559,7 @@
           <a:p>
             <a:fld id="{88DBBF51-3929-3A49-BA7D-3AF73092A0AD}" type="datetime1">
               <a:rPr lang="en-US" smtClean="0"/>
-              <a:t>12/4/2020</a:t>
+              <a:t>12/9/2020</a:t>
             </a:fld>
             <a:endParaRPr lang="en-US"/>
           </a:p>
@@ -4572,7 +4757,7 @@
           <a:p>
             <a:fld id="{36C5C674-12AF-41F5-BDE5-1132B29F8CB8}" type="datetime1">
               <a:rPr lang="en-US" smtClean="0"/>
-              <a:t>12/4/2020</a:t>
+              <a:t>12/9/2020</a:t>
             </a:fld>
             <a:endParaRPr lang="en-US"/>
           </a:p>
@@ -6945,7 +7130,7 @@
           <a:p>
             <a:fld id="{3D457031-A04F-0040-B79E-439CA9E02781}" type="datetime1">
               <a:rPr lang="en-US" smtClean="0"/>
-              <a:t>12/4/2020</a:t>
+              <a:t>12/9/2020</a:t>
             </a:fld>
             <a:endParaRPr lang="en-US"/>
           </a:p>
@@ -7195,7 +7380,7 @@
           <a:p>
             <a:fld id="{641269E8-56DE-E044-B0E5-B498755A2633}" type="datetime1">
               <a:rPr lang="en-US" smtClean="0"/>
-              <a:t>12/4/2020</a:t>
+              <a:t>12/9/2020</a:t>
             </a:fld>
             <a:endParaRPr lang="en-US"/>
           </a:p>
@@ -7581,7 +7766,7 @@
           <a:p>
             <a:fld id="{219B2A40-E9E6-7E49-9EE5-F8C2FAB652F4}" type="datetime1">
               <a:rPr lang="en-US" smtClean="0"/>
-              <a:t>12/4/2020</a:t>
+              <a:t>12/9/2020</a:t>
             </a:fld>
             <a:endParaRPr lang="en-US"/>
           </a:p>
@@ -7841,7 +8026,7 @@
           <a:p>
             <a:fld id="{08D12B45-3253-4A45-B8F9-2E00FEB0C480}" type="datetime1">
               <a:rPr lang="en-US" smtClean="0"/>
-              <a:t>12/4/2020</a:t>
+              <a:t>12/9/2020</a:t>
             </a:fld>
             <a:endParaRPr lang="en-US"/>
           </a:p>
@@ -9959,6 +10144,148 @@
       </p:grpSpPr>
       <p:sp>
         <p:nvSpPr>
+          <p:cNvPr id="2" name="Text Placeholder 1">
+            <a:extLst>
+              <a:ext uri="{FF2B5EF4-FFF2-40B4-BE49-F238E27FC236}">
+                <a16:creationId xmlns:a16="http://schemas.microsoft.com/office/drawing/2014/main" id="{33C531DF-E3C3-440B-8639-21E649B78F36}"/>
+              </a:ext>
+            </a:extLst>
+          </p:cNvPr>
+          <p:cNvSpPr>
+            <a:spLocks noGrp="1"/>
+          </p:cNvSpPr>
+          <p:nvPr>
+            <p:ph type="body" sz="quarter" idx="13"/>
+          </p:nvPr>
+        </p:nvSpPr>
+        <p:spPr/>
+        <p:txBody>
+          <a:bodyPr/>
+          <a:lstStyle/>
+          <a:p>
+            <a:endParaRPr lang="en-US"/>
+          </a:p>
+        </p:txBody>
+      </p:sp>
+      <p:sp>
+        <p:nvSpPr>
+          <p:cNvPr id="3" name="Title 2">
+            <a:extLst>
+              <a:ext uri="{FF2B5EF4-FFF2-40B4-BE49-F238E27FC236}">
+                <a16:creationId xmlns:a16="http://schemas.microsoft.com/office/drawing/2014/main" id="{3022069C-D6F9-450B-BEE1-B298C7011900}"/>
+              </a:ext>
+            </a:extLst>
+          </p:cNvPr>
+          <p:cNvSpPr>
+            <a:spLocks noGrp="1"/>
+          </p:cNvSpPr>
+          <p:nvPr>
+            <p:ph type="title"/>
+          </p:nvPr>
+        </p:nvSpPr>
+        <p:spPr/>
+        <p:txBody>
+          <a:bodyPr/>
+          <a:lstStyle/>
+          <a:p>
+            <a:endParaRPr lang="en-US"/>
+          </a:p>
+        </p:txBody>
+      </p:sp>
+      <p:sp>
+        <p:nvSpPr>
+          <p:cNvPr id="4" name="Slide Number Placeholder 3">
+            <a:extLst>
+              <a:ext uri="{FF2B5EF4-FFF2-40B4-BE49-F238E27FC236}">
+                <a16:creationId xmlns:a16="http://schemas.microsoft.com/office/drawing/2014/main" id="{B2A12721-141B-4322-AEE9-AD1B1EA9F61A}"/>
+              </a:ext>
+            </a:extLst>
+          </p:cNvPr>
+          <p:cNvSpPr>
+            <a:spLocks noGrp="1"/>
+          </p:cNvSpPr>
+          <p:nvPr>
+            <p:ph type="sldNum" sz="quarter" idx="16"/>
+          </p:nvPr>
+        </p:nvSpPr>
+        <p:spPr/>
+        <p:txBody>
+          <a:bodyPr/>
+          <a:lstStyle/>
+          <a:p>
+            <a:fld id="{1915DC07-6425-4740-9695-FB9F2ED48CC1}" type="slidenum">
+              <a:rPr lang="en-US" smtClean="0"/>
+              <a:t>10</a:t>
+            </a:fld>
+            <a:endParaRPr lang="en-US"/>
+          </a:p>
+        </p:txBody>
+      </p:sp>
+      <p:pic>
+        <p:nvPicPr>
+          <p:cNvPr id="6" name="Picture 5">
+            <a:extLst>
+              <a:ext uri="{FF2B5EF4-FFF2-40B4-BE49-F238E27FC236}">
+                <a16:creationId xmlns:a16="http://schemas.microsoft.com/office/drawing/2014/main" id="{FA581961-5DC2-40EC-93F0-93D264C55C9B}"/>
+              </a:ext>
+            </a:extLst>
+          </p:cNvPr>
+          <p:cNvPicPr>
+            <a:picLocks noChangeAspect="1"/>
+          </p:cNvPicPr>
+          <p:nvPr/>
+        </p:nvPicPr>
+        <p:blipFill>
+          <a:blip r:embed="rId3"/>
+          <a:stretch>
+            <a:fillRect/>
+          </a:stretch>
+        </p:blipFill>
+        <p:spPr>
+          <a:xfrm>
+            <a:off x="1649725" y="837708"/>
+            <a:ext cx="8729952" cy="5689096"/>
+          </a:xfrm>
+          <a:prstGeom prst="rect">
+            <a:avLst/>
+          </a:prstGeom>
+        </p:spPr>
+      </p:pic>
+    </p:spTree>
+    <p:extLst>
+      <p:ext uri="{BB962C8B-B14F-4D97-AF65-F5344CB8AC3E}">
+        <p14:creationId xmlns:p14="http://schemas.microsoft.com/office/powerpoint/2010/main" val="3220323047"/>
+      </p:ext>
+    </p:extLst>
+  </p:cSld>
+  <p:clrMapOvr>
+    <a:masterClrMapping/>
+  </p:clrMapOvr>
+  <p:transition>
+    <p:fade/>
+  </p:transition>
+</p:sld>
+</file>
+
+<file path=ppt/slides/slide11.xml><?xml version="1.0" encoding="utf-8"?>
+<p:sld xmlns:a="http://schemas.openxmlformats.org/drawingml/2006/main" xmlns:r="http://schemas.openxmlformats.org/officeDocument/2006/relationships" xmlns:p="http://schemas.openxmlformats.org/presentationml/2006/main">
+  <p:cSld>
+    <p:spTree>
+      <p:nvGrpSpPr>
+        <p:cNvPr id="1" name=""/>
+        <p:cNvGrpSpPr/>
+        <p:nvPr/>
+      </p:nvGrpSpPr>
+      <p:grpSpPr>
+        <a:xfrm>
+          <a:off x="0" y="0"/>
+          <a:ext cx="0" cy="0"/>
+          <a:chOff x="0" y="0"/>
+          <a:chExt cx="0" cy="0"/>
+        </a:xfrm>
+      </p:grpSpPr>
+      <p:sp>
+        <p:nvSpPr>
           <p:cNvPr id="3" name="Title 2">
             <a:extLst>
               <a:ext uri="{FF2B5EF4-FFF2-40B4-BE49-F238E27FC236}">
@@ -10008,7 +10335,7 @@
           <a:p>
             <a:fld id="{1915DC07-6425-4740-9695-FB9F2ED48CC1}" type="slidenum">
               <a:rPr lang="en-US" smtClean="0"/>
-              <a:t>10</a:t>
+              <a:t>11</a:t>
             </a:fld>
             <a:endParaRPr lang="en-US"/>
           </a:p>
@@ -10029,7 +10356,7 @@
           <p:nvPr/>
         </p:nvPicPr>
         <p:blipFill>
-          <a:blip r:embed="rId2"/>
+          <a:blip r:embed="rId3"/>
           <a:stretch>
             <a:fillRect/>
           </a:stretch>
@@ -10059,7 +10386,7 @@
           <p:nvPr/>
         </p:nvPicPr>
         <p:blipFill>
-          <a:blip r:embed="rId3"/>
+          <a:blip r:embed="rId4"/>
           <a:stretch>
             <a:fillRect/>
           </a:stretch>
@@ -10293,7 +10620,7 @@
 </p:sld>
 </file>
 
-<file path=ppt/slides/slide11.xml><?xml version="1.0" encoding="utf-8"?>
+<file path=ppt/slides/slide12.xml><?xml version="1.0" encoding="utf-8"?>
 <p:sld xmlns:a="http://schemas.openxmlformats.org/drawingml/2006/main" xmlns:r="http://schemas.openxmlformats.org/officeDocument/2006/relationships" xmlns:p="http://schemas.openxmlformats.org/presentationml/2006/main">
   <p:cSld>
     <p:spTree>
@@ -11076,7 +11403,7 @@
           <a:p>
             <a:fld id="{1915DC07-6425-4740-9695-FB9F2ED48CC1}" type="slidenum">
               <a:rPr lang="en-US" smtClean="0"/>
-              <a:t>11</a:t>
+              <a:t>12</a:t>
             </a:fld>
             <a:endParaRPr lang="en-US"/>
           </a:p>
@@ -11098,7 +11425,7 @@
 </p:sld>
 </file>
 
-<file path=ppt/slides/slide12.xml><?xml version="1.0" encoding="utf-8"?>
+<file path=ppt/slides/slide13.xml><?xml version="1.0" encoding="utf-8"?>
 <p:sld xmlns:a="http://schemas.openxmlformats.org/drawingml/2006/main" xmlns:r="http://schemas.openxmlformats.org/officeDocument/2006/relationships" xmlns:p="http://schemas.openxmlformats.org/presentationml/2006/main">
   <p:cSld>
     <p:spTree>
@@ -11274,7 +11601,7 @@
           <a:p>
             <a:fld id="{1915DC07-6425-4740-9695-FB9F2ED48CC1}" type="slidenum">
               <a:rPr lang="en-US" smtClean="0"/>
-              <a:t>12</a:t>
+              <a:t>13</a:t>
             </a:fld>
             <a:endParaRPr lang="en-US"/>
           </a:p>
@@ -11296,7 +11623,7 @@
 </p:sld>
 </file>
 
-<file path=ppt/slides/slide13.xml><?xml version="1.0" encoding="utf-8"?>
+<file path=ppt/slides/slide14.xml><?xml version="1.0" encoding="utf-8"?>
 <p:sld xmlns:a="http://schemas.openxmlformats.org/drawingml/2006/main" xmlns:r="http://schemas.openxmlformats.org/officeDocument/2006/relationships" xmlns:p="http://schemas.openxmlformats.org/presentationml/2006/main">
   <p:cSld>
     <p:spTree>
@@ -13806,7 +14133,7 @@
           <a:p>
             <a:fld id="{1915DC07-6425-4740-9695-FB9F2ED48CC1}" type="slidenum">
               <a:rPr lang="en-US" smtClean="0"/>
-              <a:t>13</a:t>
+              <a:t>14</a:t>
             </a:fld>
             <a:endParaRPr lang="en-US"/>
           </a:p>
@@ -13828,7 +14155,7 @@
 </p:sld>
 </file>
 
-<file path=ppt/slides/slide14.xml><?xml version="1.0" encoding="utf-8"?>
+<file path=ppt/slides/slide15.xml><?xml version="1.0" encoding="utf-8"?>
 <p:sld xmlns:a="http://schemas.openxmlformats.org/drawingml/2006/main" xmlns:r="http://schemas.openxmlformats.org/officeDocument/2006/relationships" xmlns:p="http://schemas.openxmlformats.org/presentationml/2006/main">
   <p:cSld>
     <p:spTree>
@@ -15479,7 +15806,7 @@
           <a:p>
             <a:fld id="{1915DC07-6425-4740-9695-FB9F2ED48CC1}" type="slidenum">
               <a:rPr lang="en-US" smtClean="0"/>
-              <a:t>14</a:t>
+              <a:t>15</a:t>
             </a:fld>
             <a:endParaRPr lang="en-US"/>
           </a:p>
@@ -15501,7 +15828,7 @@
 </p:sld>
 </file>
 
-<file path=ppt/slides/slide15.xml><?xml version="1.0" encoding="utf-8"?>
+<file path=ppt/slides/slide16.xml><?xml version="1.0" encoding="utf-8"?>
 <p:sld xmlns:a="http://schemas.openxmlformats.org/drawingml/2006/main" xmlns:r="http://schemas.openxmlformats.org/officeDocument/2006/relationships" xmlns:p="http://schemas.openxmlformats.org/presentationml/2006/main">
   <p:cSld>
     <p:spTree>
@@ -15564,7 +15891,7 @@
 </p:sld>
 </file>
 
-<file path=ppt/slides/slide16.xml><?xml version="1.0" encoding="utf-8"?>
+<file path=ppt/slides/slide17.xml><?xml version="1.0" encoding="utf-8"?>
 <p:sld xmlns:a="http://schemas.openxmlformats.org/drawingml/2006/main" xmlns:r="http://schemas.openxmlformats.org/officeDocument/2006/relationships" xmlns:p="http://schemas.openxmlformats.org/presentationml/2006/main">
   <p:cSld>
     <p:spTree>
@@ -19449,8 +19776,8 @@
           <a:chExt cx="0" cy="0"/>
         </a:xfrm>
       </p:grpSpPr>
-      <mc:AlternateContent xmlns:mc="http://schemas.openxmlformats.org/markup-compatibility/2006">
-        <mc:Choice xmlns:a14="http://schemas.microsoft.com/office/drawing/2010/main" Requires="a14">
+      <mc:AlternateContent xmlns:mc="http://schemas.openxmlformats.org/markup-compatibility/2006" xmlns:a14="http://schemas.microsoft.com/office/drawing/2010/main">
+        <mc:Choice Requires="a14">
           <p:sp>
             <p:nvSpPr>
               <p:cNvPr id="2" name="Text Placeholder 1">
@@ -20248,7 +20575,7 @@
             </p:txBody>
           </p:sp>
         </mc:Choice>
-        <mc:Fallback>
+        <mc:Fallback xmlns="">
           <p:sp>
             <p:nvSpPr>
               <p:cNvPr id="2" name="Text Placeholder 1">
@@ -20349,8 +20676,8 @@
           </a:p>
         </p:txBody>
       </p:sp>
-      <mc:AlternateContent xmlns:mc="http://schemas.openxmlformats.org/markup-compatibility/2006">
-        <mc:Choice xmlns:a14="http://schemas.microsoft.com/office/drawing/2010/main" Requires="a14">
+      <mc:AlternateContent xmlns:mc="http://schemas.openxmlformats.org/markup-compatibility/2006" xmlns:a14="http://schemas.microsoft.com/office/drawing/2010/main">
+        <mc:Choice Requires="a14">
           <p:sp>
             <p:nvSpPr>
               <p:cNvPr id="11" name="TextBox 10">
@@ -21320,6 +21647,7 @@
                 </a:r>
               </a:p>
               <a:p>
+                <a:pPr/>
                 <a14:m>
                   <m:oMathPara xmlns:m="http://schemas.openxmlformats.org/officeDocument/2006/math">
                     <m:oMathParaPr>
@@ -21891,7 +22219,7 @@
             </p:txBody>
           </p:sp>
         </mc:Choice>
-        <mc:Fallback>
+        <mc:Fallback xmlns="">
           <p:sp>
             <p:nvSpPr>
               <p:cNvPr id="11" name="TextBox 10">

</xml_diff>